<commit_message>
Added log to cluster, step-files, S3 test program
</commit_message>
<xml_diff>
--- a/GDELT-Explore.pptx
+++ b/GDELT-Explore.pptx
@@ -10,6 +10,7 @@
     <p:sldId id="259" r:id="rId4"/>
     <p:sldId id="260" r:id="rId5"/>
     <p:sldId id="256" r:id="rId6"/>
+    <p:sldId id="261" r:id="rId7"/>
   </p:sldIdLst>
   <p:sldSz cx="12192000" cy="6858000"/>
   <p:notesSz cx="6858000" cy="9144000"/>
@@ -108,6 +109,11 @@
       </a:defRPr>
     </a:lvl9pPr>
   </p:defaultTextStyle>
+  <p:extLst>
+    <p:ext uri="{EFAFB233-063F-42B5-8137-9DF3F51BA10A}">
+      <p15:sldGuideLst xmlns:p15="http://schemas.microsoft.com/office/powerpoint/2012/main"/>
+    </p:ext>
+  </p:extLst>
 </p:presentation>
 </file>
 
@@ -260,7 +266,7 @@
           <a:p>
             <a:fld id="{77BBE43D-A1DC-7143-9A9C-35352BD45057}" type="datetimeFigureOut">
               <a:rPr lang="fr-FR" smtClean="0"/>
-              <a:t>13/01/2020</a:t>
+              <a:t>18/01/2020</a:t>
             </a:fld>
             <a:endParaRPr lang="fr-FR"/>
           </a:p>
@@ -460,7 +466,7 @@
           <a:p>
             <a:fld id="{77BBE43D-A1DC-7143-9A9C-35352BD45057}" type="datetimeFigureOut">
               <a:rPr lang="fr-FR" smtClean="0"/>
-              <a:t>13/01/2020</a:t>
+              <a:t>18/01/2020</a:t>
             </a:fld>
             <a:endParaRPr lang="fr-FR"/>
           </a:p>
@@ -670,7 +676,7 @@
           <a:p>
             <a:fld id="{77BBE43D-A1DC-7143-9A9C-35352BD45057}" type="datetimeFigureOut">
               <a:rPr lang="fr-FR" smtClean="0"/>
-              <a:t>13/01/2020</a:t>
+              <a:t>18/01/2020</a:t>
             </a:fld>
             <a:endParaRPr lang="fr-FR"/>
           </a:p>
@@ -870,7 +876,7 @@
           <a:p>
             <a:fld id="{77BBE43D-A1DC-7143-9A9C-35352BD45057}" type="datetimeFigureOut">
               <a:rPr lang="fr-FR" smtClean="0"/>
-              <a:t>13/01/2020</a:t>
+              <a:t>18/01/2020</a:t>
             </a:fld>
             <a:endParaRPr lang="fr-FR"/>
           </a:p>
@@ -1146,7 +1152,7 @@
           <a:p>
             <a:fld id="{77BBE43D-A1DC-7143-9A9C-35352BD45057}" type="datetimeFigureOut">
               <a:rPr lang="fr-FR" smtClean="0"/>
-              <a:t>13/01/2020</a:t>
+              <a:t>18/01/2020</a:t>
             </a:fld>
             <a:endParaRPr lang="fr-FR"/>
           </a:p>
@@ -1414,7 +1420,7 @@
           <a:p>
             <a:fld id="{77BBE43D-A1DC-7143-9A9C-35352BD45057}" type="datetimeFigureOut">
               <a:rPr lang="fr-FR" smtClean="0"/>
-              <a:t>13/01/2020</a:t>
+              <a:t>18/01/2020</a:t>
             </a:fld>
             <a:endParaRPr lang="fr-FR"/>
           </a:p>
@@ -1829,7 +1835,7 @@
           <a:p>
             <a:fld id="{77BBE43D-A1DC-7143-9A9C-35352BD45057}" type="datetimeFigureOut">
               <a:rPr lang="fr-FR" smtClean="0"/>
-              <a:t>13/01/2020</a:t>
+              <a:t>18/01/2020</a:t>
             </a:fld>
             <a:endParaRPr lang="fr-FR"/>
           </a:p>
@@ -1971,7 +1977,7 @@
           <a:p>
             <a:fld id="{77BBE43D-A1DC-7143-9A9C-35352BD45057}" type="datetimeFigureOut">
               <a:rPr lang="fr-FR" smtClean="0"/>
-              <a:t>13/01/2020</a:t>
+              <a:t>18/01/2020</a:t>
             </a:fld>
             <a:endParaRPr lang="fr-FR"/>
           </a:p>
@@ -2084,7 +2090,7 @@
           <a:p>
             <a:fld id="{77BBE43D-A1DC-7143-9A9C-35352BD45057}" type="datetimeFigureOut">
               <a:rPr lang="fr-FR" smtClean="0"/>
-              <a:t>13/01/2020</a:t>
+              <a:t>18/01/2020</a:t>
             </a:fld>
             <a:endParaRPr lang="fr-FR"/>
           </a:p>
@@ -2397,7 +2403,7 @@
           <a:p>
             <a:fld id="{77BBE43D-A1DC-7143-9A9C-35352BD45057}" type="datetimeFigureOut">
               <a:rPr lang="fr-FR" smtClean="0"/>
-              <a:t>13/01/2020</a:t>
+              <a:t>18/01/2020</a:t>
             </a:fld>
             <a:endParaRPr lang="fr-FR"/>
           </a:p>
@@ -2686,7 +2692,7 @@
           <a:p>
             <a:fld id="{77BBE43D-A1DC-7143-9A9C-35352BD45057}" type="datetimeFigureOut">
               <a:rPr lang="fr-FR" smtClean="0"/>
-              <a:t>13/01/2020</a:t>
+              <a:t>18/01/2020</a:t>
             </a:fld>
             <a:endParaRPr lang="fr-FR"/>
           </a:p>
@@ -2929,7 +2935,7 @@
           <a:p>
             <a:fld id="{77BBE43D-A1DC-7143-9A9C-35352BD45057}" type="datetimeFigureOut">
               <a:rPr lang="fr-FR" smtClean="0"/>
-              <a:t>13/01/2020</a:t>
+              <a:t>18/01/2020</a:t>
             </a:fld>
             <a:endParaRPr/>
           </a:p>
@@ -4999,6 +5005,172 @@
 </p:sld>
 </file>
 
+<file path=ppt/slides/slide6.xml><?xml version="1.0" encoding="utf-8"?>
+<p:sld xmlns:a="http://schemas.openxmlformats.org/drawingml/2006/main" xmlns:r="http://schemas.openxmlformats.org/officeDocument/2006/relationships" xmlns:p="http://schemas.openxmlformats.org/presentationml/2006/main">
+  <p:cSld>
+    <p:spTree>
+      <p:nvGrpSpPr>
+        <p:cNvPr id="1" name=""/>
+        <p:cNvGrpSpPr/>
+        <p:nvPr/>
+      </p:nvGrpSpPr>
+      <p:grpSpPr>
+        <a:xfrm>
+          <a:off x="0" y="0"/>
+          <a:ext cx="0" cy="0"/>
+          <a:chOff x="0" y="0"/>
+          <a:chExt cx="0" cy="0"/>
+        </a:xfrm>
+      </p:grpSpPr>
+      <p:sp>
+        <p:nvSpPr>
+          <p:cNvPr id="2" name="Rectangle 1">
+            <a:extLst>
+              <a:ext uri="{FF2B5EF4-FFF2-40B4-BE49-F238E27FC236}">
+                <a16:creationId xmlns:a16="http://schemas.microsoft.com/office/drawing/2014/main" id="{CE00D134-0865-0344-8798-8E8E2DFA02F6}"/>
+              </a:ext>
+            </a:extLst>
+          </p:cNvPr>
+          <p:cNvSpPr/>
+          <p:nvPr/>
+        </p:nvSpPr>
+        <p:spPr>
+          <a:xfrm>
+            <a:off x="2079054" y="4526597"/>
+            <a:ext cx="4221027" cy="369332"/>
+          </a:xfrm>
+          <a:prstGeom prst="rect">
+            <a:avLst/>
+          </a:prstGeom>
+        </p:spPr>
+        <p:txBody>
+          <a:bodyPr wrap="none">
+            <a:spAutoFit/>
+          </a:bodyPr>
+          <a:lstStyle/>
+          <a:p>
+            <a:r>
+              <a:rPr lang="fr-FR" dirty="0">
+                <a:solidFill>
+                  <a:srgbClr val="999999"/>
+                </a:solidFill>
+                <a:latin typeface="Helvetica Neue" panose="02000503000000020004" pitchFamily="2" charset="0"/>
+              </a:rPr>
+              <a:t>EC2 instances : EMR_EC2_DefaultRole</a:t>
+            </a:r>
+            <a:endParaRPr dirty="0"/>
+          </a:p>
+        </p:txBody>
+      </p:sp>
+      <p:sp>
+        <p:nvSpPr>
+          <p:cNvPr id="3" name="ZoneTexte 2">
+            <a:extLst>
+              <a:ext uri="{FF2B5EF4-FFF2-40B4-BE49-F238E27FC236}">
+                <a16:creationId xmlns:a16="http://schemas.microsoft.com/office/drawing/2014/main" id="{2CCD2843-9E5B-5E41-B187-B49D7861BD98}"/>
+              </a:ext>
+            </a:extLst>
+          </p:cNvPr>
+          <p:cNvSpPr txBox="1"/>
+          <p:nvPr/>
+        </p:nvSpPr>
+        <p:spPr>
+          <a:xfrm>
+            <a:off x="1303283" y="2331403"/>
+            <a:ext cx="2512739" cy="1477328"/>
+          </a:xfrm>
+          <a:prstGeom prst="rect">
+            <a:avLst/>
+          </a:prstGeom>
+          <a:noFill/>
+        </p:spPr>
+        <p:txBody>
+          <a:bodyPr wrap="none" rtlCol="0">
+            <a:spAutoFit/>
+          </a:bodyPr>
+          <a:lstStyle/>
+          <a:p>
+            <a:r>
+              <a:rPr lang="fr-CH" dirty="0"/>
+              <a:t>S3 </a:t>
+            </a:r>
+            <a:r>
+              <a:rPr lang="fr-CH" dirty="0" err="1"/>
+              <a:t>bucket</a:t>
+            </a:r>
+            <a:r>
+              <a:rPr lang="fr-CH" dirty="0"/>
+              <a:t> : </a:t>
+            </a:r>
+            <a:r>
+              <a:rPr lang="fr-CH" dirty="0" err="1"/>
+              <a:t>fufu</a:t>
+            </a:r>
+            <a:r>
+              <a:rPr lang="fr-CH" dirty="0"/>
+              <a:t>-program</a:t>
+            </a:r>
+          </a:p>
+          <a:p>
+            <a:pPr marL="285750" indent="-285750">
+              <a:buFontTx/>
+              <a:buChar char="-"/>
+            </a:pPr>
+            <a:r>
+              <a:rPr lang="fr-CH" dirty="0"/>
+              <a:t>jars/</a:t>
+            </a:r>
+          </a:p>
+          <a:p>
+            <a:pPr marL="285750" indent="-285750">
+              <a:buFontTx/>
+              <a:buChar char="-"/>
+            </a:pPr>
+            <a:r>
+              <a:rPr lang="fr-CH" dirty="0"/>
+              <a:t>data/</a:t>
+            </a:r>
+          </a:p>
+          <a:p>
+            <a:pPr marL="285750" indent="-285750">
+              <a:buFontTx/>
+              <a:buChar char="-"/>
+            </a:pPr>
+            <a:r>
+              <a:rPr lang="fr-CH" dirty="0" err="1"/>
+              <a:t>bigdata</a:t>
+            </a:r>
+            <a:r>
+              <a:rPr lang="fr-CH" dirty="0"/>
+              <a:t>/</a:t>
+            </a:r>
+          </a:p>
+          <a:p>
+            <a:pPr marL="285750" indent="-285750">
+              <a:buFontTx/>
+              <a:buChar char="-"/>
+            </a:pPr>
+            <a:r>
+              <a:rPr lang="fr-CH"/>
+              <a:t>logs/</a:t>
+            </a:r>
+            <a:endParaRPr dirty="0"/>
+          </a:p>
+        </p:txBody>
+      </p:sp>
+    </p:spTree>
+    <p:extLst>
+      <p:ext uri="{BB962C8B-B14F-4D97-AF65-F5344CB8AC3E}">
+        <p14:creationId xmlns:p14="http://schemas.microsoft.com/office/powerpoint/2010/main" val="1384711365"/>
+      </p:ext>
+    </p:extLst>
+  </p:cSld>
+  <p:clrMapOvr>
+    <a:masterClrMapping/>
+  </p:clrMapOvr>
+</p:sld>
+</file>
+
 <file path=ppt/theme/theme1.xml><?xml version="1.0" encoding="utf-8"?>
 <a:theme xmlns:a="http://schemas.openxmlformats.org/drawingml/2006/main" name="Thème Office">
   <a:themeElements>

</xml_diff>

<commit_message>
QueryA now pushed to Cassandra
</commit_message>
<xml_diff>
--- a/GDELT-Explore.pptx
+++ b/GDELT-Explore.pptx
@@ -11,6 +11,7 @@
     <p:sldId id="260" r:id="rId5"/>
     <p:sldId id="256" r:id="rId6"/>
     <p:sldId id="261" r:id="rId7"/>
+    <p:sldId id="262" r:id="rId8"/>
   </p:sldIdLst>
   <p:sldSz cx="12192000" cy="6858000"/>
   <p:notesSz cx="6858000" cy="9144000"/>
@@ -5151,8 +5152,44 @@
               <a:buChar char="-"/>
             </a:pPr>
             <a:r>
-              <a:rPr lang="fr-CH"/>
+              <a:rPr lang="fr-CH" dirty="0"/>
               <a:t>logs/</a:t>
+            </a:r>
+            <a:endParaRPr dirty="0"/>
+          </a:p>
+        </p:txBody>
+      </p:sp>
+      <p:sp>
+        <p:nvSpPr>
+          <p:cNvPr id="4" name="ZoneTexte 3">
+            <a:extLst>
+              <a:ext uri="{FF2B5EF4-FFF2-40B4-BE49-F238E27FC236}">
+                <a16:creationId xmlns:a16="http://schemas.microsoft.com/office/drawing/2014/main" id="{184FBA34-4F9E-0E45-8F8D-646218990247}"/>
+              </a:ext>
+            </a:extLst>
+          </p:cNvPr>
+          <p:cNvSpPr txBox="1"/>
+          <p:nvPr/>
+        </p:nvSpPr>
+        <p:spPr>
+          <a:xfrm>
+            <a:off x="1555531" y="4014952"/>
+            <a:ext cx="1492396" cy="369332"/>
+          </a:xfrm>
+          <a:prstGeom prst="rect">
+            <a:avLst/>
+          </a:prstGeom>
+          <a:noFill/>
+        </p:spPr>
+        <p:txBody>
+          <a:bodyPr wrap="none" rtlCol="0">
+            <a:spAutoFit/>
+          </a:bodyPr>
+          <a:lstStyle/>
+          <a:p>
+            <a:r>
+              <a:rPr lang="fr-CH" dirty="0"/>
+              <a:t>Policy sur rôle</a:t>
             </a:r>
             <a:endParaRPr dirty="0"/>
           </a:p>
@@ -5162,6 +5199,36 @@
     <p:extLst>
       <p:ext uri="{BB962C8B-B14F-4D97-AF65-F5344CB8AC3E}">
         <p14:creationId xmlns:p14="http://schemas.microsoft.com/office/powerpoint/2010/main" val="1384711365"/>
+      </p:ext>
+    </p:extLst>
+  </p:cSld>
+  <p:clrMapOvr>
+    <a:masterClrMapping/>
+  </p:clrMapOvr>
+</p:sld>
+</file>
+
+<file path=ppt/slides/slide7.xml><?xml version="1.0" encoding="utf-8"?>
+<p:sld xmlns:a="http://schemas.openxmlformats.org/drawingml/2006/main" xmlns:r="http://schemas.openxmlformats.org/officeDocument/2006/relationships" xmlns:p="http://schemas.openxmlformats.org/presentationml/2006/main">
+  <p:cSld>
+    <p:spTree>
+      <p:nvGrpSpPr>
+        <p:cNvPr id="1" name=""/>
+        <p:cNvGrpSpPr/>
+        <p:nvPr/>
+      </p:nvGrpSpPr>
+      <p:grpSpPr>
+        <a:xfrm>
+          <a:off x="0" y="0"/>
+          <a:ext cx="0" cy="0"/>
+          <a:chOff x="0" y="0"/>
+          <a:chExt cx="0" cy="0"/>
+        </a:xfrm>
+      </p:grpSpPr>
+    </p:spTree>
+    <p:extLst>
+      <p:ext uri="{BB962C8B-B14F-4D97-AF65-F5344CB8AC3E}">
+        <p14:creationId xmlns:p14="http://schemas.microsoft.com/office/powerpoint/2010/main" val="2433377229"/>
       </p:ext>
     </p:extLst>
   </p:cSld>

</xml_diff>